<commit_message>
Modificacao no slide de indicadores
</commit_message>
<xml_diff>
--- a/apresentacao/A eficiência de um e-commerce.pptx
+++ b/apresentacao/A eficiência de um e-commerce.pptx
@@ -5,7 +5,7 @@
     <p:sldMasterId id="2147483659" r:id="rId1"/>
   </p:sldMasterIdLst>
   <p:notesMasterIdLst>
-    <p:notesMasterId r:id="rId12"/>
+    <p:notesMasterId r:id="rId11"/>
   </p:notesMasterIdLst>
   <p:sldIdLst>
     <p:sldId id="256" r:id="rId2"/>
@@ -16,25 +16,24 @@
     <p:sldId id="261" r:id="rId7"/>
     <p:sldId id="262" r:id="rId8"/>
     <p:sldId id="264" r:id="rId9"/>
-    <p:sldId id="267" r:id="rId10"/>
-    <p:sldId id="269" r:id="rId11"/>
+    <p:sldId id="269" r:id="rId10"/>
   </p:sldIdLst>
   <p:sldSz cx="9144000" cy="5143500" type="screen16x9"/>
   <p:notesSz cx="6858000" cy="9144000"/>
   <p:embeddedFontLst>
     <p:embeddedFont>
       <p:font typeface="Raleway" panose="020B0604020202020204" charset="0"/>
-      <p:regular r:id="rId13"/>
-      <p:bold r:id="rId14"/>
-      <p:italic r:id="rId15"/>
-      <p:boldItalic r:id="rId16"/>
+      <p:regular r:id="rId12"/>
+      <p:bold r:id="rId13"/>
+      <p:italic r:id="rId14"/>
+      <p:boldItalic r:id="rId15"/>
     </p:embeddedFont>
     <p:embeddedFont>
       <p:font typeface="Lato" panose="020B0604020202020204" charset="0"/>
-      <p:regular r:id="rId17"/>
-      <p:bold r:id="rId18"/>
-      <p:italic r:id="rId19"/>
-      <p:boldItalic r:id="rId20"/>
+      <p:regular r:id="rId16"/>
+      <p:bold r:id="rId17"/>
+      <p:italic r:id="rId18"/>
+      <p:boldItalic r:id="rId19"/>
     </p:embeddedFont>
   </p:embeddedFontLst>
   <p:defaultTextStyle>
@@ -993,133 +992,6 @@
 </p:notes>
 </file>
 
-<file path=ppt/notesSlides/notesSlide10.xml><?xml version="1.0" encoding="utf-8"?>
-<p:notes xmlns:a="http://schemas.openxmlformats.org/drawingml/2006/main" xmlns:r="http://schemas.openxmlformats.org/officeDocument/2006/relationships" xmlns:p="http://schemas.openxmlformats.org/presentationml/2006/main" showMasterSp="0" showMasterPhAnim="0">
-  <p:cSld>
-    <p:spTree>
-      <p:nvGrpSpPr>
-        <p:cNvPr id="1" name="Shape 142"/>
-        <p:cNvGrpSpPr/>
-        <p:nvPr/>
-      </p:nvGrpSpPr>
-      <p:grpSpPr>
-        <a:xfrm>
-          <a:off x="0" y="0"/>
-          <a:ext cx="0" cy="0"/>
-          <a:chOff x="0" y="0"/>
-          <a:chExt cx="0" cy="0"/>
-        </a:xfrm>
-      </p:grpSpPr>
-      <p:sp>
-        <p:nvSpPr>
-          <p:cNvPr id="143" name="Google Shape;143;p12:notes"/>
-          <p:cNvSpPr>
-            <a:spLocks noGrp="1" noRot="1" noChangeAspect="1"/>
-          </p:cNvSpPr>
-          <p:nvPr>
-            <p:ph type="sldImg" idx="2"/>
-          </p:nvPr>
-        </p:nvSpPr>
-        <p:spPr>
-          <a:xfrm>
-            <a:off x="381000" y="685800"/>
-            <a:ext cx="6096000" cy="3429000"/>
-          </a:xfrm>
-          <a:custGeom>
-            <a:avLst/>
-            <a:gdLst/>
-            <a:ahLst/>
-            <a:cxnLst/>
-            <a:rect l="l" t="t" r="r" b="b"/>
-            <a:pathLst>
-              <a:path w="120000" h="120000" extrusionOk="0">
-                <a:moveTo>
-                  <a:pt x="0" y="0"/>
-                </a:moveTo>
-                <a:lnTo>
-                  <a:pt x="120000" y="0"/>
-                </a:lnTo>
-                <a:lnTo>
-                  <a:pt x="120000" y="120000"/>
-                </a:lnTo>
-                <a:lnTo>
-                  <a:pt x="0" y="120000"/>
-                </a:lnTo>
-                <a:close/>
-              </a:path>
-            </a:pathLst>
-          </a:custGeom>
-          <a:noFill/>
-          <a:ln w="9525" cap="flat" cmpd="sng">
-            <a:solidFill>
-              <a:srgbClr val="000000"/>
-            </a:solidFill>
-            <a:prstDash val="solid"/>
-            <a:round/>
-            <a:headEnd type="none" w="sm" len="sm"/>
-            <a:tailEnd type="none" w="sm" len="sm"/>
-          </a:ln>
-        </p:spPr>
-      </p:sp>
-      <p:sp>
-        <p:nvSpPr>
-          <p:cNvPr id="144" name="Google Shape;144;p12:notes"/>
-          <p:cNvSpPr txBox="1">
-            <a:spLocks noGrp="1"/>
-          </p:cNvSpPr>
-          <p:nvPr>
-            <p:ph type="body" idx="1"/>
-          </p:nvPr>
-        </p:nvSpPr>
-        <p:spPr>
-          <a:xfrm>
-            <a:off x="685800" y="4343400"/>
-            <a:ext cx="5486400" cy="4114800"/>
-          </a:xfrm>
-          <a:prstGeom prst="rect">
-            <a:avLst/>
-          </a:prstGeom>
-          <a:noFill/>
-          <a:ln>
-            <a:noFill/>
-          </a:ln>
-        </p:spPr>
-        <p:txBody>
-          <a:bodyPr spcFirstLastPara="1" wrap="square" lIns="91425" tIns="91425" rIns="91425" bIns="91425" anchor="t" anchorCtr="0">
-            <a:noAutofit/>
-          </a:bodyPr>
-          <a:lstStyle/>
-          <a:p>
-            <a:pPr marL="0" lvl="0" indent="0" algn="l" rtl="0">
-              <a:lnSpc>
-                <a:spcPct val="100000"/>
-              </a:lnSpc>
-              <a:spcBef>
-                <a:spcPts val="0"/>
-              </a:spcBef>
-              <a:spcAft>
-                <a:spcPts val="0"/>
-              </a:spcAft>
-              <a:buSzPts val="1400"/>
-              <a:buNone/>
-            </a:pPr>
-            <a:endParaRPr/>
-          </a:p>
-        </p:txBody>
-      </p:sp>
-    </p:spTree>
-    <p:extLst>
-      <p:ext uri="{BB962C8B-B14F-4D97-AF65-F5344CB8AC3E}">
-        <p14:creationId xmlns:p14="http://schemas.microsoft.com/office/powerpoint/2010/main" val="1090892161"/>
-      </p:ext>
-    </p:extLst>
-  </p:cSld>
-  <p:clrMapOvr>
-    <a:masterClrMapping/>
-  </p:clrMapOvr>
-</p:notes>
-</file>
-
 <file path=ppt/notesSlides/notesSlide2.xml><?xml version="1.0" encoding="utf-8"?>
 <p:notes xmlns:a="http://schemas.openxmlformats.org/drawingml/2006/main" xmlns:r="http://schemas.openxmlformats.org/officeDocument/2006/relationships" xmlns:p="http://schemas.openxmlformats.org/presentationml/2006/main" showMasterSp="0" showMasterPhAnim="0">
   <p:cSld>
@@ -2014,7 +1886,7 @@
   <p:cSld>
     <p:spTree>
       <p:nvGrpSpPr>
-        <p:cNvPr id="1" name="Shape 132"/>
+        <p:cNvPr id="1" name="Shape 142"/>
         <p:cNvGrpSpPr/>
         <p:nvPr/>
       </p:nvGrpSpPr>
@@ -2028,7 +1900,7 @@
       </p:grpSpPr>
       <p:sp>
         <p:nvSpPr>
-          <p:cNvPr id="133" name="Google Shape;133;g2b1cbe796c7_3_0:notes"/>
+          <p:cNvPr id="143" name="Google Shape;143;p12:notes"/>
           <p:cNvSpPr>
             <a:spLocks noGrp="1" noRot="1" noChangeAspect="1"/>
           </p:cNvSpPr>
@@ -2079,7 +1951,7 @@
       </p:sp>
       <p:sp>
         <p:nvSpPr>
-          <p:cNvPr id="134" name="Google Shape;134;g2b1cbe796c7_3_0:notes"/>
+          <p:cNvPr id="144" name="Google Shape;144;p12:notes"/>
           <p:cNvSpPr txBox="1">
             <a:spLocks noGrp="1"/>
           </p:cNvSpPr>
@@ -2126,7 +1998,7 @@
     </p:spTree>
     <p:extLst>
       <p:ext uri="{BB962C8B-B14F-4D97-AF65-F5344CB8AC3E}">
-        <p14:creationId xmlns:p14="http://schemas.microsoft.com/office/powerpoint/2010/main" val="462312542"/>
+        <p14:creationId xmlns:p14="http://schemas.microsoft.com/office/powerpoint/2010/main" val="1090892161"/>
       </p:ext>
     </p:extLst>
   </p:cSld>
@@ -11029,159 +10901,6 @@
 </p:sld>
 </file>
 
-<file path=ppt/slides/slide10.xml><?xml version="1.0" encoding="utf-8"?>
-<p:sld xmlns:a="http://schemas.openxmlformats.org/drawingml/2006/main" xmlns:r="http://schemas.openxmlformats.org/officeDocument/2006/relationships" xmlns:p="http://schemas.openxmlformats.org/presentationml/2006/main">
-  <p:cSld>
-    <p:bg>
-      <p:bgPr>
-        <a:solidFill>
-          <a:schemeClr val="dk1"/>
-        </a:solidFill>
-        <a:effectLst/>
-      </p:bgPr>
-    </p:bg>
-    <p:spTree>
-      <p:nvGrpSpPr>
-        <p:cNvPr id="1" name="Shape 145"/>
-        <p:cNvGrpSpPr/>
-        <p:nvPr/>
-      </p:nvGrpSpPr>
-      <p:grpSpPr>
-        <a:xfrm>
-          <a:off x="0" y="0"/>
-          <a:ext cx="0" cy="0"/>
-          <a:chOff x="0" y="0"/>
-          <a:chExt cx="0" cy="0"/>
-        </a:xfrm>
-      </p:grpSpPr>
-      <p:pic>
-        <p:nvPicPr>
-          <p:cNvPr id="146" name="Google Shape;146;p26"/>
-          <p:cNvPicPr preferRelativeResize="0"/>
-          <p:nvPr/>
-        </p:nvPicPr>
-        <p:blipFill rotWithShape="1">
-          <a:blip r:embed="rId3">
-            <a:alphaModFix/>
-          </a:blip>
-          <a:srcRect/>
-          <a:stretch/>
-        </p:blipFill>
-        <p:spPr>
-          <a:xfrm>
-            <a:off x="2345550" y="1352581"/>
-            <a:ext cx="4254600" cy="2328475"/>
-          </a:xfrm>
-          <a:prstGeom prst="rect">
-            <a:avLst/>
-          </a:prstGeom>
-          <a:noFill/>
-          <a:ln>
-            <a:noFill/>
-          </a:ln>
-        </p:spPr>
-      </p:pic>
-      <p:pic>
-        <p:nvPicPr>
-          <p:cNvPr id="147" name="Google Shape;147;p26" descr="Pedaço de fita adesiva prendendo uma nota ao slid"/>
-          <p:cNvPicPr preferRelativeResize="0"/>
-          <p:nvPr/>
-        </p:nvPicPr>
-        <p:blipFill rotWithShape="1">
-          <a:blip r:embed="rId4">
-            <a:alphaModFix/>
-          </a:blip>
-          <a:srcRect l="9243" t="5926" r="2118" b="10011"/>
-          <a:stretch/>
-        </p:blipFill>
-        <p:spPr>
-          <a:xfrm rot="154828">
-            <a:off x="3635150" y="1163601"/>
-            <a:ext cx="2072000" cy="736050"/>
-          </a:xfrm>
-          <a:prstGeom prst="rect">
-            <a:avLst/>
-          </a:prstGeom>
-          <a:noFill/>
-          <a:ln>
-            <a:noFill/>
-          </a:ln>
-        </p:spPr>
-      </p:pic>
-      <p:sp>
-        <p:nvSpPr>
-          <p:cNvPr id="148" name="Google Shape;148;p26"/>
-          <p:cNvSpPr txBox="1"/>
-          <p:nvPr/>
-        </p:nvSpPr>
-        <p:spPr>
-          <a:xfrm>
-            <a:off x="3093450" y="2135513"/>
-            <a:ext cx="2957100" cy="762600"/>
-          </a:xfrm>
-          <a:prstGeom prst="rect">
-            <a:avLst/>
-          </a:prstGeom>
-          <a:noFill/>
-          <a:ln>
-            <a:noFill/>
-          </a:ln>
-        </p:spPr>
-        <p:txBody>
-          <a:bodyPr spcFirstLastPara="1" wrap="square" lIns="91425" tIns="91425" rIns="91425" bIns="91425" anchor="b" anchorCtr="0">
-            <a:noAutofit/>
-          </a:bodyPr>
-          <a:lstStyle/>
-          <a:p>
-            <a:pPr marL="0" marR="0" lvl="0" indent="0" algn="l" rtl="0">
-              <a:lnSpc>
-                <a:spcPct val="100000"/>
-              </a:lnSpc>
-              <a:spcBef>
-                <a:spcPts val="0"/>
-              </a:spcBef>
-              <a:spcAft>
-                <a:spcPts val="0"/>
-              </a:spcAft>
-              <a:buClr>
-                <a:srgbClr val="000000"/>
-              </a:buClr>
-              <a:buSzPts val="3000"/>
-              <a:buFont typeface="Arial"/>
-              <a:buNone/>
-            </a:pPr>
-            <a:r>
-              <a:rPr lang="pt-BR" sz="3000" b="1" i="0" u="none" strike="noStrike" cap="none">
-                <a:solidFill>
-                  <a:schemeClr val="lt2"/>
-                </a:solidFill>
-                <a:latin typeface="Raleway"/>
-                <a:ea typeface="Raleway"/>
-                <a:cs typeface="Raleway"/>
-                <a:sym typeface="Raleway"/>
-              </a:rPr>
-              <a:t>Agradecemos!</a:t>
-            </a:r>
-            <a:endParaRPr sz="3000" b="1" i="0" u="none" strike="noStrike" cap="none">
-              <a:solidFill>
-                <a:schemeClr val="lt2"/>
-              </a:solidFill>
-              <a:latin typeface="Raleway"/>
-              <a:ea typeface="Raleway"/>
-              <a:cs typeface="Raleway"/>
-              <a:sym typeface="Raleway"/>
-            </a:endParaRPr>
-          </a:p>
-        </p:txBody>
-      </p:sp>
-    </p:spTree>
-  </p:cSld>
-  <p:clrMapOvr>
-    <a:masterClrMapping/>
-  </p:clrMapOvr>
-</p:sld>
-</file>
-
 <file path=ppt/slides/slide2.xml><?xml version="1.0" encoding="utf-8"?>
 <p:sld xmlns:a="http://schemas.openxmlformats.org/drawingml/2006/main" xmlns:r="http://schemas.openxmlformats.org/officeDocument/2006/relationships" xmlns:p="http://schemas.openxmlformats.org/presentationml/2006/main">
   <p:cSld>
@@ -12041,7 +11760,7 @@
         <p:spPr>
           <a:xfrm>
             <a:off x="283099" y="712150"/>
-            <a:ext cx="8622300" cy="3835500"/>
+            <a:ext cx="8622300" cy="722512"/>
           </a:xfrm>
           <a:prstGeom prst="rect">
             <a:avLst/>
@@ -12076,81 +11795,390 @@
                   <a:schemeClr val="accent5"/>
                 </a:solidFill>
               </a:rPr>
-              <a:t>Indicadores:</a:t>
+              <a:t>Indicadores</a:t>
+            </a:r>
+            <a:r>
+              <a:rPr lang="pt-BR" dirty="0" smtClean="0">
+                <a:solidFill>
+                  <a:schemeClr val="accent5"/>
+                </a:solidFill>
+              </a:rPr>
+              <a:t>:</a:t>
             </a:r>
             <a:endParaRPr dirty="0"/>
           </a:p>
+        </p:txBody>
+      </p:sp>
+      <p:sp>
+        <p:nvSpPr>
+          <p:cNvPr id="3" name="Google Shape;126;p22"/>
+          <p:cNvSpPr txBox="1">
+            <a:spLocks/>
+          </p:cNvSpPr>
+          <p:nvPr/>
+        </p:nvSpPr>
+        <p:spPr>
+          <a:xfrm>
+            <a:off x="283099" y="1671145"/>
+            <a:ext cx="8622300" cy="3121572"/>
+          </a:xfrm>
+          <a:prstGeom prst="rect">
+            <a:avLst/>
+          </a:prstGeom>
+          <a:noFill/>
+          <a:ln>
+            <a:noFill/>
+          </a:ln>
+        </p:spPr>
+        <p:txBody>
+          <a:bodyPr spcFirstLastPara="1" wrap="square" lIns="91425" tIns="91425" rIns="91425" bIns="91425" anchor="t" anchorCtr="0">
+            <a:noAutofit/>
+          </a:bodyPr>
+          <a:lstStyle>
+            <a:defPPr marR="0" lvl="0" algn="l" rtl="0">
+              <a:lnSpc>
+                <a:spcPct val="100000"/>
+              </a:lnSpc>
+              <a:spcBef>
+                <a:spcPts val="0"/>
+              </a:spcBef>
+              <a:spcAft>
+                <a:spcPts val="0"/>
+              </a:spcAft>
+            </a:defPPr>
+            <a:lvl1pPr marR="0" lvl="0" algn="l" rtl="0">
+              <a:lnSpc>
+                <a:spcPct val="100000"/>
+              </a:lnSpc>
+              <a:spcBef>
+                <a:spcPts val="0"/>
+              </a:spcBef>
+              <a:spcAft>
+                <a:spcPts val="0"/>
+              </a:spcAft>
+              <a:buClr>
+                <a:schemeClr val="lt1"/>
+              </a:buClr>
+              <a:buSzPts val="4800"/>
+              <a:buFont typeface="Raleway"/>
+              <a:buNone/>
+              <a:defRPr sz="4800" b="1" i="0" u="none" strike="noStrike" cap="none">
+                <a:solidFill>
+                  <a:schemeClr val="lt1"/>
+                </a:solidFill>
+                <a:latin typeface="Raleway"/>
+                <a:ea typeface="Raleway"/>
+                <a:cs typeface="Raleway"/>
+                <a:sym typeface="Raleway"/>
+              </a:defRPr>
+            </a:lvl1pPr>
+            <a:lvl2pPr marR="0" lvl="1" algn="l" rtl="0">
+              <a:lnSpc>
+                <a:spcPct val="100000"/>
+              </a:lnSpc>
+              <a:spcBef>
+                <a:spcPts val="0"/>
+              </a:spcBef>
+              <a:spcAft>
+                <a:spcPts val="0"/>
+              </a:spcAft>
+              <a:buClr>
+                <a:schemeClr val="lt1"/>
+              </a:buClr>
+              <a:buSzPts val="4800"/>
+              <a:buFont typeface="Raleway"/>
+              <a:buNone/>
+              <a:defRPr sz="4800" b="1" i="0" u="none" strike="noStrike" cap="none">
+                <a:solidFill>
+                  <a:schemeClr val="lt1"/>
+                </a:solidFill>
+                <a:latin typeface="Raleway"/>
+                <a:ea typeface="Raleway"/>
+                <a:cs typeface="Raleway"/>
+                <a:sym typeface="Raleway"/>
+              </a:defRPr>
+            </a:lvl2pPr>
+            <a:lvl3pPr marR="0" lvl="2" algn="l" rtl="0">
+              <a:lnSpc>
+                <a:spcPct val="100000"/>
+              </a:lnSpc>
+              <a:spcBef>
+                <a:spcPts val="0"/>
+              </a:spcBef>
+              <a:spcAft>
+                <a:spcPts val="0"/>
+              </a:spcAft>
+              <a:buClr>
+                <a:schemeClr val="lt1"/>
+              </a:buClr>
+              <a:buSzPts val="4800"/>
+              <a:buFont typeface="Raleway"/>
+              <a:buNone/>
+              <a:defRPr sz="4800" b="1" i="0" u="none" strike="noStrike" cap="none">
+                <a:solidFill>
+                  <a:schemeClr val="lt1"/>
+                </a:solidFill>
+                <a:latin typeface="Raleway"/>
+                <a:ea typeface="Raleway"/>
+                <a:cs typeface="Raleway"/>
+                <a:sym typeface="Raleway"/>
+              </a:defRPr>
+            </a:lvl3pPr>
+            <a:lvl4pPr marR="0" lvl="3" algn="l" rtl="0">
+              <a:lnSpc>
+                <a:spcPct val="100000"/>
+              </a:lnSpc>
+              <a:spcBef>
+                <a:spcPts val="0"/>
+              </a:spcBef>
+              <a:spcAft>
+                <a:spcPts val="0"/>
+              </a:spcAft>
+              <a:buClr>
+                <a:schemeClr val="lt1"/>
+              </a:buClr>
+              <a:buSzPts val="4800"/>
+              <a:buFont typeface="Raleway"/>
+              <a:buNone/>
+              <a:defRPr sz="4800" b="1" i="0" u="none" strike="noStrike" cap="none">
+                <a:solidFill>
+                  <a:schemeClr val="lt1"/>
+                </a:solidFill>
+                <a:latin typeface="Raleway"/>
+                <a:ea typeface="Raleway"/>
+                <a:cs typeface="Raleway"/>
+                <a:sym typeface="Raleway"/>
+              </a:defRPr>
+            </a:lvl4pPr>
+            <a:lvl5pPr marR="0" lvl="4" algn="l" rtl="0">
+              <a:lnSpc>
+                <a:spcPct val="100000"/>
+              </a:lnSpc>
+              <a:spcBef>
+                <a:spcPts val="0"/>
+              </a:spcBef>
+              <a:spcAft>
+                <a:spcPts val="0"/>
+              </a:spcAft>
+              <a:buClr>
+                <a:schemeClr val="lt1"/>
+              </a:buClr>
+              <a:buSzPts val="4800"/>
+              <a:buFont typeface="Raleway"/>
+              <a:buNone/>
+              <a:defRPr sz="4800" b="1" i="0" u="none" strike="noStrike" cap="none">
+                <a:solidFill>
+                  <a:schemeClr val="lt1"/>
+                </a:solidFill>
+                <a:latin typeface="Raleway"/>
+                <a:ea typeface="Raleway"/>
+                <a:cs typeface="Raleway"/>
+                <a:sym typeface="Raleway"/>
+              </a:defRPr>
+            </a:lvl5pPr>
+            <a:lvl6pPr marR="0" lvl="5" algn="l" rtl="0">
+              <a:lnSpc>
+                <a:spcPct val="100000"/>
+              </a:lnSpc>
+              <a:spcBef>
+                <a:spcPts val="0"/>
+              </a:spcBef>
+              <a:spcAft>
+                <a:spcPts val="0"/>
+              </a:spcAft>
+              <a:buClr>
+                <a:schemeClr val="lt1"/>
+              </a:buClr>
+              <a:buSzPts val="4800"/>
+              <a:buFont typeface="Raleway"/>
+              <a:buNone/>
+              <a:defRPr sz="4800" b="1" i="0" u="none" strike="noStrike" cap="none">
+                <a:solidFill>
+                  <a:schemeClr val="lt1"/>
+                </a:solidFill>
+                <a:latin typeface="Raleway"/>
+                <a:ea typeface="Raleway"/>
+                <a:cs typeface="Raleway"/>
+                <a:sym typeface="Raleway"/>
+              </a:defRPr>
+            </a:lvl6pPr>
+            <a:lvl7pPr marR="0" lvl="6" algn="l" rtl="0">
+              <a:lnSpc>
+                <a:spcPct val="100000"/>
+              </a:lnSpc>
+              <a:spcBef>
+                <a:spcPts val="0"/>
+              </a:spcBef>
+              <a:spcAft>
+                <a:spcPts val="0"/>
+              </a:spcAft>
+              <a:buClr>
+                <a:schemeClr val="lt1"/>
+              </a:buClr>
+              <a:buSzPts val="4800"/>
+              <a:buFont typeface="Raleway"/>
+              <a:buNone/>
+              <a:defRPr sz="4800" b="1" i="0" u="none" strike="noStrike" cap="none">
+                <a:solidFill>
+                  <a:schemeClr val="lt1"/>
+                </a:solidFill>
+                <a:latin typeface="Raleway"/>
+                <a:ea typeface="Raleway"/>
+                <a:cs typeface="Raleway"/>
+                <a:sym typeface="Raleway"/>
+              </a:defRPr>
+            </a:lvl7pPr>
+            <a:lvl8pPr marR="0" lvl="7" algn="l" rtl="0">
+              <a:lnSpc>
+                <a:spcPct val="100000"/>
+              </a:lnSpc>
+              <a:spcBef>
+                <a:spcPts val="0"/>
+              </a:spcBef>
+              <a:spcAft>
+                <a:spcPts val="0"/>
+              </a:spcAft>
+              <a:buClr>
+                <a:schemeClr val="lt1"/>
+              </a:buClr>
+              <a:buSzPts val="4800"/>
+              <a:buFont typeface="Raleway"/>
+              <a:buNone/>
+              <a:defRPr sz="4800" b="1" i="0" u="none" strike="noStrike" cap="none">
+                <a:solidFill>
+                  <a:schemeClr val="lt1"/>
+                </a:solidFill>
+                <a:latin typeface="Raleway"/>
+                <a:ea typeface="Raleway"/>
+                <a:cs typeface="Raleway"/>
+                <a:sym typeface="Raleway"/>
+              </a:defRPr>
+            </a:lvl8pPr>
+            <a:lvl9pPr marR="0" lvl="8" algn="l" rtl="0">
+              <a:lnSpc>
+                <a:spcPct val="100000"/>
+              </a:lnSpc>
+              <a:spcBef>
+                <a:spcPts val="0"/>
+              </a:spcBef>
+              <a:spcAft>
+                <a:spcPts val="0"/>
+              </a:spcAft>
+              <a:buClr>
+                <a:schemeClr val="lt1"/>
+              </a:buClr>
+              <a:buSzPts val="4800"/>
+              <a:buFont typeface="Raleway"/>
+              <a:buNone/>
+              <a:defRPr sz="4800" b="1" i="0" u="none" strike="noStrike" cap="none">
+                <a:solidFill>
+                  <a:schemeClr val="lt1"/>
+                </a:solidFill>
+                <a:latin typeface="Raleway"/>
+                <a:ea typeface="Raleway"/>
+                <a:cs typeface="Raleway"/>
+                <a:sym typeface="Raleway"/>
+              </a:defRPr>
+            </a:lvl9pPr>
+          </a:lstStyle>
           <a:p>
-            <a:pPr marL="457200" lvl="0" indent="-381000" algn="l" rtl="0">
+            <a:pPr marL="457200" indent="-381000">
               <a:lnSpc>
                 <a:spcPct val="115000"/>
               </a:lnSpc>
-              <a:spcBef>
-                <a:spcPts val="1200"/>
-              </a:spcBef>
-              <a:spcAft>
-                <a:spcPts val="0"/>
-              </a:spcAft>
               <a:buSzPts val="2400"/>
+              <a:buFont typeface="Raleway"/>
               <a:buChar char="●"/>
             </a:pPr>
             <a:r>
               <a:rPr lang="pt-BR" sz="2400" b="0" dirty="0"/>
-              <a:t>Qual o número de compras realizadas hoje?</a:t>
+              <a:t>Qual o número de compras canceladas hoje </a:t>
             </a:r>
-            <a:endParaRPr sz="2400" b="0" dirty="0"/>
+            <a:r>
+              <a:rPr lang="pt-BR" sz="2400" b="0" dirty="0" smtClean="0"/>
+              <a:t>?</a:t>
+            </a:r>
           </a:p>
           <a:p>
-            <a:pPr marL="457200" lvl="0" indent="-381000" algn="l" rtl="0">
+            <a:pPr marL="457200" indent="-381000">
               <a:lnSpc>
                 <a:spcPct val="115000"/>
               </a:lnSpc>
-              <a:spcBef>
-                <a:spcPts val="0"/>
-              </a:spcBef>
-              <a:spcAft>
-                <a:spcPts val="0"/>
-              </a:spcAft>
               <a:buSzPts val="2400"/>
+              <a:buFont typeface="Raleway"/>
+              <a:buChar char="●"/>
+            </a:pPr>
+            <a:r>
+              <a:rPr lang="pt-BR" sz="2400" b="0" dirty="0"/>
+              <a:t>Qual o número de compras realizadas hoje</a:t>
+            </a:r>
+            <a:r>
+              <a:rPr lang="pt-BR" sz="2400" b="0" dirty="0" smtClean="0"/>
+              <a:t>?</a:t>
+            </a:r>
+          </a:p>
+          <a:p>
+            <a:pPr marL="457200" indent="-381000">
+              <a:lnSpc>
+                <a:spcPct val="115000"/>
+              </a:lnSpc>
+              <a:buSzPts val="2400"/>
+              <a:buFont typeface="Raleway"/>
+              <a:buChar char="●"/>
+            </a:pPr>
+            <a:r>
+              <a:rPr lang="pt-BR" sz="2400" b="0" dirty="0"/>
+              <a:t>Quais estoques não </a:t>
+            </a:r>
+            <a:r>
+              <a:rPr lang="pt-BR" sz="2400" b="0" dirty="0" smtClean="0"/>
+              <a:t>tiveram </a:t>
+            </a:r>
+            <a:r>
+              <a:rPr lang="pt-BR" sz="2400" b="0" dirty="0"/>
+              <a:t>seus produtos vendidos completamente</a:t>
+            </a:r>
+            <a:r>
+              <a:rPr lang="pt-BR" sz="2400" b="0" dirty="0" smtClean="0"/>
+              <a:t>?</a:t>
+            </a:r>
+          </a:p>
+          <a:p>
+            <a:pPr marL="457200" indent="-381000">
+              <a:lnSpc>
+                <a:spcPct val="115000"/>
+              </a:lnSpc>
+              <a:buSzPts val="2400"/>
+              <a:buFont typeface="Raleway"/>
               <a:buChar char="●"/>
             </a:pPr>
             <a:r>
               <a:rPr lang="pt-BR" sz="2400" b="0" dirty="0" smtClean="0"/>
-              <a:t>Qual </a:t>
+              <a:t>Quantas devoluções ao todo um produto teve?</a:t>
             </a:r>
-            <a:r>
-              <a:rPr lang="pt-BR" sz="2400" b="0" dirty="0"/>
-              <a:t>o número </a:t>
-            </a:r>
-            <a:r>
-              <a:rPr lang="pt-BR" sz="2400" b="0" dirty="0" smtClean="0"/>
-              <a:t>de </a:t>
-            </a:r>
-            <a:r>
-              <a:rPr lang="pt-BR" sz="2400" b="0" dirty="0"/>
-              <a:t>compras canceladas hoje ?</a:t>
-            </a:r>
-            <a:endParaRPr sz="2400" b="0" dirty="0"/>
           </a:p>
           <a:p>
-            <a:pPr marL="457200" lvl="0" indent="-381000" algn="l" rtl="0">
+            <a:pPr marL="457200" indent="-381000">
               <a:lnSpc>
                 <a:spcPct val="115000"/>
               </a:lnSpc>
-              <a:spcBef>
-                <a:spcPts val="0"/>
-              </a:spcBef>
-              <a:spcAft>
-                <a:spcPts val="0"/>
-              </a:spcAft>
               <a:buSzPts val="2400"/>
+              <a:buFont typeface="Raleway"/>
               <a:buChar char="●"/>
             </a:pPr>
             <a:r>
               <a:rPr lang="pt-BR" sz="2400" b="0" dirty="0"/>
-              <a:t>Qual o número de compras que passaram para o status ‘Pagamento efetuado’ hoje e quantas passaram para o status “entregue”?</a:t>
+              <a:t>Quais produtos </a:t>
             </a:r>
-            <a:endParaRPr sz="2400" b="0" dirty="0"/>
+            <a:r>
+              <a:rPr lang="pt-BR" sz="2400" b="0" dirty="0" smtClean="0"/>
+              <a:t>foram </a:t>
+            </a:r>
+            <a:r>
+              <a:rPr lang="pt-BR" sz="2400" b="0" dirty="0"/>
+              <a:t>passado da validade?</a:t>
+            </a:r>
+            <a:endParaRPr lang="pt-BR" sz="2400" b="0" dirty="0"/>
           </a:p>
         </p:txBody>
       </p:sp>
@@ -12246,20 +12274,16 @@
               <a:buChar char="●"/>
             </a:pPr>
             <a:r>
-              <a:rPr lang="pt-BR" sz="2400" b="0" dirty="0"/>
-              <a:t>Qual a média de compras </a:t>
+              <a:rPr lang="pt-BR" sz="2400" b="0" dirty="0" smtClean="0"/>
+              <a:t>Qual a média de vendas por mês </a:t>
             </a:r>
             <a:r>
               <a:rPr lang="pt-BR" sz="2400" b="0" dirty="0" smtClean="0"/>
-              <a:t>por </a:t>
-            </a:r>
-            <a:r>
-              <a:rPr lang="pt-BR" sz="2400" b="0" dirty="0"/>
-              <a:t>mês ? </a:t>
+              <a:t>do ano atual</a:t>
             </a:r>
             <a:r>
               <a:rPr lang="pt-BR" sz="2400" b="0" dirty="0" smtClean="0"/>
-              <a:t>por semestre ?</a:t>
+              <a:t>?</a:t>
             </a:r>
             <a:endParaRPr sz="2400" b="0" dirty="0" smtClean="0"/>
           </a:p>
@@ -12279,14 +12303,14 @@
             </a:pPr>
             <a:r>
               <a:rPr lang="pt-BR" sz="2400" b="0" dirty="0" smtClean="0"/>
-              <a:t>Qual o número de compras por loja?</a:t>
+              <a:t>Qual o número de vendas por loja?</a:t>
             </a:r>
             <a:br>
               <a:rPr lang="pt-BR" sz="2400" b="0" dirty="0" smtClean="0"/>
             </a:br>
             <a:r>
               <a:rPr lang="pt-BR" sz="2400" b="0" dirty="0" smtClean="0"/>
-              <a:t>Qual o número de compras por categoria ?</a:t>
+              <a:t>Qual o número de vendas por categoria ?</a:t>
             </a:r>
             <a:endParaRPr sz="2400" b="0" dirty="0" smtClean="0"/>
           </a:p>
@@ -12306,7 +12330,11 @@
             </a:pPr>
             <a:r>
               <a:rPr lang="pt-BR" sz="2400" b="0" dirty="0" smtClean="0"/>
-              <a:t>Qual o número de compras por subcategoria ?</a:t>
+              <a:t>Qual </a:t>
+            </a:r>
+            <a:r>
+              <a:rPr lang="pt-BR" sz="2400" b="0" dirty="0" smtClean="0"/>
+              <a:t>o número de compras por subcategoria ?</a:t>
             </a:r>
             <a:endParaRPr sz="2400" b="0" dirty="0"/>
           </a:p>
@@ -12795,9 +12823,17 @@
 <file path=ppt/slides/slide9.xml><?xml version="1.0" encoding="utf-8"?>
 <p:sld xmlns:a="http://schemas.openxmlformats.org/drawingml/2006/main" xmlns:r="http://schemas.openxmlformats.org/officeDocument/2006/relationships" xmlns:p="http://schemas.openxmlformats.org/presentationml/2006/main">
   <p:cSld>
+    <p:bg>
+      <p:bgPr>
+        <a:solidFill>
+          <a:schemeClr val="dk1"/>
+        </a:solidFill>
+        <a:effectLst/>
+      </p:bgPr>
+    </p:bg>
     <p:spTree>
       <p:nvGrpSpPr>
-        <p:cNvPr id="1" name="Shape 135"/>
+        <p:cNvPr id="1" name="Shape 145"/>
         <p:cNvGrpSpPr/>
         <p:nvPr/>
       </p:nvGrpSpPr>
@@ -12809,20 +12845,70 @@
           <a:chExt cx="0" cy="0"/>
         </a:xfrm>
       </p:grpSpPr>
+      <p:pic>
+        <p:nvPicPr>
+          <p:cNvPr id="146" name="Google Shape;146;p26"/>
+          <p:cNvPicPr preferRelativeResize="0"/>
+          <p:nvPr/>
+        </p:nvPicPr>
+        <p:blipFill rotWithShape="1">
+          <a:blip r:embed="rId3">
+            <a:alphaModFix/>
+          </a:blip>
+          <a:srcRect/>
+          <a:stretch/>
+        </p:blipFill>
+        <p:spPr>
+          <a:xfrm>
+            <a:off x="2345550" y="1352581"/>
+            <a:ext cx="4254600" cy="2328475"/>
+          </a:xfrm>
+          <a:prstGeom prst="rect">
+            <a:avLst/>
+          </a:prstGeom>
+          <a:noFill/>
+          <a:ln>
+            <a:noFill/>
+          </a:ln>
+        </p:spPr>
+      </p:pic>
+      <p:pic>
+        <p:nvPicPr>
+          <p:cNvPr id="147" name="Google Shape;147;p26" descr="Pedaço de fita adesiva prendendo uma nota ao slid"/>
+          <p:cNvPicPr preferRelativeResize="0"/>
+          <p:nvPr/>
+        </p:nvPicPr>
+        <p:blipFill rotWithShape="1">
+          <a:blip r:embed="rId4">
+            <a:alphaModFix/>
+          </a:blip>
+          <a:srcRect l="9243" t="5926" r="2118" b="10011"/>
+          <a:stretch/>
+        </p:blipFill>
+        <p:spPr>
+          <a:xfrm rot="154828">
+            <a:off x="3635150" y="1163601"/>
+            <a:ext cx="2072000" cy="736050"/>
+          </a:xfrm>
+          <a:prstGeom prst="rect">
+            <a:avLst/>
+          </a:prstGeom>
+          <a:noFill/>
+          <a:ln>
+            <a:noFill/>
+          </a:ln>
+        </p:spPr>
+      </p:pic>
       <p:sp>
         <p:nvSpPr>
-          <p:cNvPr id="136" name="Google Shape;136;p24"/>
-          <p:cNvSpPr txBox="1">
-            <a:spLocks noGrp="1"/>
-          </p:cNvSpPr>
-          <p:nvPr>
-            <p:ph type="title"/>
-          </p:nvPr>
+          <p:cNvPr id="148" name="Google Shape;148;p26"/>
+          <p:cNvSpPr txBox="1"/>
+          <p:nvPr/>
         </p:nvSpPr>
         <p:spPr>
           <a:xfrm>
-            <a:off x="260850" y="327925"/>
-            <a:ext cx="8622300" cy="2994176"/>
+            <a:off x="3093450" y="2135513"/>
+            <a:ext cx="2957100" cy="762600"/>
           </a:xfrm>
           <a:prstGeom prst="rect">
             <a:avLst/>
@@ -12833,105 +12919,49 @@
           </a:ln>
         </p:spPr>
         <p:txBody>
-          <a:bodyPr spcFirstLastPara="1" wrap="square" lIns="91425" tIns="91425" rIns="91425" bIns="91425" anchor="t" anchorCtr="0">
+          <a:bodyPr spcFirstLastPara="1" wrap="square" lIns="91425" tIns="91425" rIns="91425" bIns="91425" anchor="b" anchorCtr="0">
             <a:noAutofit/>
           </a:bodyPr>
           <a:lstStyle/>
           <a:p>
-            <a:pPr marL="0" lvl="0" indent="0" algn="l" rtl="0">
-              <a:lnSpc>
-                <a:spcPct val="100000"/>
-              </a:lnSpc>
-              <a:spcBef>
-                <a:spcPts val="0"/>
-              </a:spcBef>
-              <a:spcAft>
-                <a:spcPts val="0"/>
-              </a:spcAft>
-              <a:buSzPts val="4800"/>
+            <a:pPr marL="0" marR="0" lvl="0" indent="0" algn="l" rtl="0">
+              <a:lnSpc>
+                <a:spcPct val="100000"/>
+              </a:lnSpc>
+              <a:spcBef>
+                <a:spcPts val="0"/>
+              </a:spcBef>
+              <a:spcAft>
+                <a:spcPts val="0"/>
+              </a:spcAft>
+              <a:buClr>
+                <a:srgbClr val="000000"/>
+              </a:buClr>
+              <a:buSzPts val="3000"/>
+              <a:buFont typeface="Arial"/>
               <a:buNone/>
             </a:pPr>
             <a:r>
-              <a:rPr lang="pt-BR" dirty="0">
-                <a:solidFill>
-                  <a:schemeClr val="accent5"/>
-                </a:solidFill>
+              <a:rPr lang="pt-BR" sz="3000" b="1" i="0" u="none" strike="noStrike" cap="none">
+                <a:solidFill>
+                  <a:schemeClr val="lt2"/>
+                </a:solidFill>
+                <a:latin typeface="Raleway"/>
+                <a:ea typeface="Raleway"/>
+                <a:cs typeface="Raleway"/>
+                <a:sym typeface="Raleway"/>
               </a:rPr>
-              <a:t>Indicadores:</a:t>
+              <a:t>Agradecemos!</a:t>
             </a:r>
-            <a:endParaRPr sz="2400" dirty="0"/>
-          </a:p>
-          <a:p>
-            <a:pPr marL="457200" lvl="0" indent="-381000" algn="l" rtl="0">
-              <a:lnSpc>
-                <a:spcPct val="115000"/>
-              </a:lnSpc>
-              <a:spcBef>
-                <a:spcPts val="1200"/>
-              </a:spcBef>
-              <a:spcAft>
-                <a:spcPts val="0"/>
-              </a:spcAft>
-              <a:buSzPts val="2400"/>
-              <a:buChar char="●"/>
-            </a:pPr>
-            <a:r>
-              <a:rPr lang="pt-BR" sz="2400" b="0" dirty="0"/>
-              <a:t>Quais estoques não tiverem seus produtos vendidos completamente</a:t>
-            </a:r>
-            <a:r>
-              <a:rPr lang="pt-BR" sz="2400" b="0" dirty="0" smtClean="0"/>
-              <a:t>?</a:t>
-            </a:r>
-            <a:endParaRPr sz="2400" b="0" dirty="0" smtClean="0"/>
-          </a:p>
-          <a:p>
-            <a:pPr marL="457200" lvl="0" indent="-381000" algn="l" rtl="0">
-              <a:lnSpc>
-                <a:spcPct val="115000"/>
-              </a:lnSpc>
-              <a:spcBef>
-                <a:spcPts val="0"/>
-              </a:spcBef>
-              <a:spcAft>
-                <a:spcPts val="0"/>
-              </a:spcAft>
-              <a:buSzPts val="2400"/>
-              <a:buChar char="●"/>
-            </a:pPr>
-            <a:r>
-              <a:rPr lang="pt-BR" sz="2400" b="0" dirty="0" smtClean="0"/>
-              <a:t>Qual </a:t>
-            </a:r>
-            <a:r>
-              <a:rPr lang="pt-BR" sz="2400" b="0" dirty="0"/>
-              <a:t>estoque de produto que teve mais devoluções</a:t>
-            </a:r>
-            <a:r>
-              <a:rPr lang="pt-BR" sz="2400" b="0" dirty="0" smtClean="0"/>
-              <a:t>?</a:t>
-            </a:r>
-            <a:endParaRPr sz="2400" b="0" dirty="0" smtClean="0"/>
-          </a:p>
-          <a:p>
-            <a:pPr marL="457200" lvl="0" indent="-381000" algn="l" rtl="0">
-              <a:lnSpc>
-                <a:spcPct val="115000"/>
-              </a:lnSpc>
-              <a:spcBef>
-                <a:spcPts val="0"/>
-              </a:spcBef>
-              <a:spcAft>
-                <a:spcPts val="0"/>
-              </a:spcAft>
-              <a:buSzPts val="2400"/>
-              <a:buChar char="●"/>
-            </a:pPr>
-            <a:r>
-              <a:rPr lang="pt-BR" sz="2400" b="0" dirty="0" smtClean="0"/>
-              <a:t>Quais produtos alimentício foram passado da validade?</a:t>
-            </a:r>
-            <a:endParaRPr sz="2400" b="0" dirty="0" smtClean="0"/>
+            <a:endParaRPr sz="3000" b="1" i="0" u="none" strike="noStrike" cap="none">
+              <a:solidFill>
+                <a:schemeClr val="lt2"/>
+              </a:solidFill>
+              <a:latin typeface="Raleway"/>
+              <a:ea typeface="Raleway"/>
+              <a:cs typeface="Raleway"/>
+              <a:sym typeface="Raleway"/>
+            </a:endParaRPr>
           </a:p>
         </p:txBody>
       </p:sp>

</xml_diff>